<commit_message>
Subo modelo de base de datos
</commit_message>
<xml_diff>
--- a/Dulcería RIVZAP.pptx
+++ b/Dulcería RIVZAP.pptx
@@ -113,7 +113,7 @@
   </p:defaultTextStyle>
   <p:extLst>
     <p:ext uri="{EFAFB233-063F-42B5-8137-9DF3F51BA10A}">
-      <p15:sldGuideLst xmlns:p15="http://schemas.microsoft.com/office/powerpoint/2012/main" xmlns="">
+      <p15:sldGuideLst xmlns:p15="http://schemas.microsoft.com/office/powerpoint/2012/main">
         <p15:guide id="1" orient="horz" pos="2160">
           <p15:clr>
             <a:srgbClr val="A4A3A4"/>
@@ -311,7 +311,7 @@
           <a:p>
             <a:fld id="{FB9757C2-29E5-4041-9845-0C795D3F05E5}" type="datetimeFigureOut">
               <a:rPr lang="es-CL" smtClean="0"/>
-              <a:t>17-05-2017</a:t>
+              <a:t>03-06-2017</a:t>
             </a:fld>
             <a:endParaRPr lang="es-CL"/>
           </a:p>
@@ -481,7 +481,7 @@
           <a:p>
             <a:fld id="{FB9757C2-29E5-4041-9845-0C795D3F05E5}" type="datetimeFigureOut">
               <a:rPr lang="es-CL" smtClean="0"/>
-              <a:t>17-05-2017</a:t>
+              <a:t>03-06-2017</a:t>
             </a:fld>
             <a:endParaRPr lang="es-CL"/>
           </a:p>
@@ -661,7 +661,7 @@
           <a:p>
             <a:fld id="{FB9757C2-29E5-4041-9845-0C795D3F05E5}" type="datetimeFigureOut">
               <a:rPr lang="es-CL" smtClean="0"/>
-              <a:t>17-05-2017</a:t>
+              <a:t>03-06-2017</a:t>
             </a:fld>
             <a:endParaRPr lang="es-CL"/>
           </a:p>
@@ -831,7 +831,7 @@
           <a:p>
             <a:fld id="{FB9757C2-29E5-4041-9845-0C795D3F05E5}" type="datetimeFigureOut">
               <a:rPr lang="es-CL" smtClean="0"/>
-              <a:t>17-05-2017</a:t>
+              <a:t>03-06-2017</a:t>
             </a:fld>
             <a:endParaRPr lang="es-CL"/>
           </a:p>
@@ -1077,7 +1077,7 @@
           <a:p>
             <a:fld id="{FB9757C2-29E5-4041-9845-0C795D3F05E5}" type="datetimeFigureOut">
               <a:rPr lang="es-CL" smtClean="0"/>
-              <a:t>17-05-2017</a:t>
+              <a:t>03-06-2017</a:t>
             </a:fld>
             <a:endParaRPr lang="es-CL"/>
           </a:p>
@@ -1365,7 +1365,7 @@
           <a:p>
             <a:fld id="{FB9757C2-29E5-4041-9845-0C795D3F05E5}" type="datetimeFigureOut">
               <a:rPr lang="es-CL" smtClean="0"/>
-              <a:t>17-05-2017</a:t>
+              <a:t>03-06-2017</a:t>
             </a:fld>
             <a:endParaRPr lang="es-CL"/>
           </a:p>
@@ -1787,7 +1787,7 @@
           <a:p>
             <a:fld id="{FB9757C2-29E5-4041-9845-0C795D3F05E5}" type="datetimeFigureOut">
               <a:rPr lang="es-CL" smtClean="0"/>
-              <a:t>17-05-2017</a:t>
+              <a:t>03-06-2017</a:t>
             </a:fld>
             <a:endParaRPr lang="es-CL"/>
           </a:p>
@@ -1905,7 +1905,7 @@
           <a:p>
             <a:fld id="{FB9757C2-29E5-4041-9845-0C795D3F05E5}" type="datetimeFigureOut">
               <a:rPr lang="es-CL" smtClean="0"/>
-              <a:t>17-05-2017</a:t>
+              <a:t>03-06-2017</a:t>
             </a:fld>
             <a:endParaRPr lang="es-CL"/>
           </a:p>
@@ -2000,7 +2000,7 @@
           <a:p>
             <a:fld id="{FB9757C2-29E5-4041-9845-0C795D3F05E5}" type="datetimeFigureOut">
               <a:rPr lang="es-CL" smtClean="0"/>
-              <a:t>17-05-2017</a:t>
+              <a:t>03-06-2017</a:t>
             </a:fld>
             <a:endParaRPr lang="es-CL"/>
           </a:p>
@@ -2277,7 +2277,7 @@
           <a:p>
             <a:fld id="{FB9757C2-29E5-4041-9845-0C795D3F05E5}" type="datetimeFigureOut">
               <a:rPr lang="es-CL" smtClean="0"/>
-              <a:t>17-05-2017</a:t>
+              <a:t>03-06-2017</a:t>
             </a:fld>
             <a:endParaRPr lang="es-CL"/>
           </a:p>
@@ -2530,7 +2530,7 @@
           <a:p>
             <a:fld id="{FB9757C2-29E5-4041-9845-0C795D3F05E5}" type="datetimeFigureOut">
               <a:rPr lang="es-CL" smtClean="0"/>
-              <a:t>17-05-2017</a:t>
+              <a:t>03-06-2017</a:t>
             </a:fld>
             <a:endParaRPr lang="es-CL"/>
           </a:p>
@@ -2748,7 +2748,7 @@
           <a:p>
             <a:fld id="{FB9757C2-29E5-4041-9845-0C795D3F05E5}" type="datetimeFigureOut">
               <a:rPr lang="es-CL" smtClean="0"/>
-              <a:t>17-05-2017</a:t>
+              <a:t>03-06-2017</a:t>
             </a:fld>
             <a:endParaRPr lang="es-CL"/>
           </a:p>
@@ -3216,27 +3216,7 @@
                   </a:outerShdw>
                 </a:effectLst>
               </a:rPr>
-              <a:t>para compras con despacho a domicilio Dulcería </a:t>
-            </a:r>
-            <a:r>
-              <a:rPr lang="es-CL" sz="6000" b="1" spc="50" dirty="0" smtClean="0">
-                <a:ln w="11430">
-                  <a:solidFill>
-                    <a:schemeClr val="tx1"/>
-                  </a:solidFill>
-                </a:ln>
-                <a:solidFill>
-                  <a:srgbClr val="00B0F0"/>
-                </a:solidFill>
-                <a:effectLst>
-                  <a:outerShdw blurRad="76200" dist="50800" dir="5400000" algn="tl" rotWithShape="0">
-                    <a:srgbClr val="000000">
-                      <a:alpha val="65000"/>
-                    </a:srgbClr>
-                  </a:outerShdw>
-                </a:effectLst>
-              </a:rPr>
-              <a:t>RIVZAP</a:t>
+              <a:t>para compras con despacho a domicilio Dulcería RIVZAP</a:t>
             </a:r>
             <a:endParaRPr lang="es-CL" sz="6000" b="1" spc="50" dirty="0">
               <a:ln w="11430">
@@ -3459,11 +3439,7 @@
             <a:pPr algn="just"/>
             <a:r>
               <a:rPr lang="es-CL" sz="2400" dirty="0" smtClean="0"/>
-              <a:t>En el estrecho mercado de los dulces, la empresa desea ampliar el grupo de personas al que atiende generando un nuev</a:t>
-            </a:r>
-            <a:r>
-              <a:rPr lang="es-CL" sz="2400" dirty="0" smtClean="0"/>
-              <a:t>o mecanismo de ventas, a través del despacho a domicilio.</a:t>
+              <a:t>En el estrecho mercado de los dulces, la empresa desea ampliar el grupo de personas al que atiende generando un nuevo mecanismo de ventas, a través del despacho a domicilio.</a:t>
             </a:r>
             <a:endParaRPr lang="es-CL" sz="2400" dirty="0"/>
           </a:p>
@@ -3540,11 +3516,7 @@
             <a:pPr algn="just"/>
             <a:r>
               <a:rPr lang="es-CL" sz="2400" dirty="0" smtClean="0"/>
-              <a:t>Página web para ventas con despacho a domicilio que permita generar ventas y que se pueda adaptar tanto a PC como a Móviles</a:t>
-            </a:r>
-            <a:r>
-              <a:rPr lang="es-CL" sz="2400" dirty="0" smtClean="0"/>
-              <a:t>.</a:t>
+              <a:t>Página web para ventas con despacho a domicilio que permita generar ventas y que se pueda adaptar tanto a PC como a Móviles.</a:t>
             </a:r>
             <a:endParaRPr lang="es-CL" sz="2400" dirty="0"/>
           </a:p>
@@ -3643,15 +3615,7 @@
             </a:pPr>
             <a:r>
               <a:rPr lang="es-CL" sz="2000" dirty="0" smtClean="0"/>
-              <a:t>La aplicación debe ser adaptable </a:t>
-            </a:r>
-            <a:r>
-              <a:rPr lang="es-CL" sz="2000" dirty="0" smtClean="0"/>
-              <a:t>para pc y dispositivos </a:t>
-            </a:r>
-            <a:r>
-              <a:rPr lang="es-CL" sz="2000" dirty="0" smtClean="0"/>
-              <a:t>móviles</a:t>
+              <a:t>La aplicación debe ser adaptable para pc y dispositivos móviles</a:t>
             </a:r>
             <a:r>
               <a:rPr lang="es-CL" sz="2000" dirty="0"/>
@@ -3661,7 +3625,6 @@
               <a:rPr lang="es-CL" sz="2000" dirty="0" smtClean="0"/>
               <a:t>(responsiva).</a:t>
             </a:r>
-            <a:endParaRPr lang="es-CL" sz="2000" dirty="0" smtClean="0"/>
           </a:p>
           <a:p>
             <a:pPr marL="342900" indent="-342900" algn="just">
@@ -3669,10 +3632,13 @@
               <a:buAutoNum type="arabicPeriod"/>
             </a:pPr>
             <a:r>
-              <a:rPr lang="es-CL" sz="2000" dirty="0" smtClean="0"/>
+              <a:rPr lang="es-CL" sz="2000" dirty="0" smtClean="0">
+                <a:solidFill>
+                  <a:srgbClr val="FF0000"/>
+                </a:solidFill>
+              </a:rPr>
               <a:t>Se deberá crear un logo para la empresa.</a:t>
             </a:r>
-            <a:endParaRPr lang="es-CL" sz="2000" dirty="0" smtClean="0"/>
           </a:p>
           <a:p>
             <a:pPr marL="342900" indent="-342900" algn="just">
@@ -3680,7 +3646,11 @@
               <a:buAutoNum type="arabicPeriod"/>
             </a:pPr>
             <a:r>
-              <a:rPr lang="es-CL" sz="2000" dirty="0"/>
+              <a:rPr lang="es-CL" sz="2000" dirty="0">
+                <a:solidFill>
+                  <a:srgbClr val="FF0000"/>
+                </a:solidFill>
+              </a:rPr>
               <a:t>Debe tener colores alusivos al diseño del logo.</a:t>
             </a:r>
           </a:p>
@@ -3691,17 +3661,8 @@
             </a:pPr>
             <a:r>
               <a:rPr lang="es-CL" sz="2000" dirty="0" smtClean="0"/>
-              <a:t>Autodidacta </a:t>
-            </a:r>
-            <a:r>
-              <a:rPr lang="es-CL" sz="2000" dirty="0" smtClean="0"/>
-              <a:t>(fácil de </a:t>
-            </a:r>
-            <a:r>
-              <a:rPr lang="es-CL" sz="2000" dirty="0" smtClean="0"/>
-              <a:t>navegar - intuitivo).</a:t>
-            </a:r>
-            <a:endParaRPr lang="es-CL" sz="2000" dirty="0" smtClean="0"/>
+              <a:t>Autodidacta (fácil de navegar - intuitivo).</a:t>
+            </a:r>
           </a:p>
           <a:p>
             <a:pPr marL="342900" indent="-342900" algn="just">
@@ -3709,12 +3670,12 @@
               <a:buAutoNum type="arabicPeriod"/>
             </a:pPr>
             <a:r>
-              <a:rPr lang="es-CL" sz="2000" dirty="0" smtClean="0"/>
-              <a:t>En todas las pantallas de la solución se debe visualizar la dirección de Casa Matriz</a:t>
-            </a:r>
-            <a:r>
-              <a:rPr lang="es-CL" sz="2000" dirty="0" smtClean="0"/>
-              <a:t>.</a:t>
+              <a:rPr lang="es-CL" sz="2000" dirty="0" smtClean="0">
+                <a:solidFill>
+                  <a:srgbClr val="FF0000"/>
+                </a:solidFill>
+              </a:rPr>
+              <a:t>En todas las pantallas de la solución se debe visualizar la dirección de Casa Matriz.</a:t>
             </a:r>
           </a:p>
           <a:p>
@@ -3743,10 +3704,17 @@
               <a:buAutoNum type="arabicPeriod"/>
             </a:pPr>
             <a:r>
+              <a:rPr lang="es-CL" sz="2000" dirty="0" smtClean="0">
+                <a:solidFill>
+                  <a:srgbClr val="FF0000"/>
+                </a:solidFill>
+              </a:rPr>
+              <a:t>Ingreso de usuarios y contraseñas</a:t>
+            </a:r>
+            <a:r>
               <a:rPr lang="es-CL" sz="2000" dirty="0" smtClean="0"/>
-              <a:t>Ingreso de usuarios y contraseñas.</a:t>
-            </a:r>
-            <a:endParaRPr lang="es-CL" sz="2000" dirty="0" smtClean="0"/>
+              <a:t>.</a:t>
+            </a:r>
           </a:p>
           <a:p>
             <a:pPr marL="342900" indent="-342900" algn="just">

</xml_diff>